<commit_message>
Generated images for use in the ReadMe.md file
</commit_message>
<xml_diff>
--- a/RPCPlayground/ClassDiagram.pptx
+++ b/RPCPlayground/ClassDiagram.pptx
@@ -9,6 +9,7 @@
     <p:sldId id="258" r:id="rId3"/>
     <p:sldId id="260" r:id="rId4"/>
     <p:sldId id="259" r:id="rId5"/>
+    <p:sldId id="261" r:id="rId6"/>
   </p:sldIdLst>
   <p:sldSz cx="9144000" cy="6858000" type="screen4x3"/>
   <p:notesSz cx="6858000" cy="9144000"/>
@@ -292,7 +293,7 @@
             <a:fld id="{1196C21C-BF02-5B43-B1DA-1A862CF808D7}" type="datetimeFigureOut">
               <a:rPr lang="en-US" smtClean="0"/>
               <a:pPr/>
-              <a:t>3/9/18</a:t>
+              <a:t>3/19/18</a:t>
             </a:fld>
             <a:endParaRPr lang="en-US"/>
           </a:p>
@@ -459,7 +460,7 @@
             <a:fld id="{1196C21C-BF02-5B43-B1DA-1A862CF808D7}" type="datetimeFigureOut">
               <a:rPr lang="en-US" smtClean="0"/>
               <a:pPr/>
-              <a:t>3/9/18</a:t>
+              <a:t>3/19/18</a:t>
             </a:fld>
             <a:endParaRPr lang="en-US"/>
           </a:p>
@@ -636,7 +637,7 @@
             <a:fld id="{1196C21C-BF02-5B43-B1DA-1A862CF808D7}" type="datetimeFigureOut">
               <a:rPr lang="en-US" smtClean="0"/>
               <a:pPr/>
-              <a:t>3/9/18</a:t>
+              <a:t>3/19/18</a:t>
             </a:fld>
             <a:endParaRPr lang="en-US"/>
           </a:p>
@@ -803,7 +804,7 @@
             <a:fld id="{1196C21C-BF02-5B43-B1DA-1A862CF808D7}" type="datetimeFigureOut">
               <a:rPr lang="en-US" smtClean="0"/>
               <a:pPr/>
-              <a:t>3/9/18</a:t>
+              <a:t>3/19/18</a:t>
             </a:fld>
             <a:endParaRPr lang="en-US"/>
           </a:p>
@@ -1046,7 +1047,7 @@
             <a:fld id="{1196C21C-BF02-5B43-B1DA-1A862CF808D7}" type="datetimeFigureOut">
               <a:rPr lang="en-US" smtClean="0"/>
               <a:pPr/>
-              <a:t>3/9/18</a:t>
+              <a:t>3/19/18</a:t>
             </a:fld>
             <a:endParaRPr lang="en-US"/>
           </a:p>
@@ -1331,7 +1332,7 @@
             <a:fld id="{1196C21C-BF02-5B43-B1DA-1A862CF808D7}" type="datetimeFigureOut">
               <a:rPr lang="en-US" smtClean="0"/>
               <a:pPr/>
-              <a:t>3/9/18</a:t>
+              <a:t>3/19/18</a:t>
             </a:fld>
             <a:endParaRPr lang="en-US"/>
           </a:p>
@@ -1750,7 +1751,7 @@
             <a:fld id="{1196C21C-BF02-5B43-B1DA-1A862CF808D7}" type="datetimeFigureOut">
               <a:rPr lang="en-US" smtClean="0"/>
               <a:pPr/>
-              <a:t>3/9/18</a:t>
+              <a:t>3/19/18</a:t>
             </a:fld>
             <a:endParaRPr lang="en-US"/>
           </a:p>
@@ -1865,7 +1866,7 @@
             <a:fld id="{1196C21C-BF02-5B43-B1DA-1A862CF808D7}" type="datetimeFigureOut">
               <a:rPr lang="en-US" smtClean="0"/>
               <a:pPr/>
-              <a:t>3/9/18</a:t>
+              <a:t>3/19/18</a:t>
             </a:fld>
             <a:endParaRPr lang="en-US"/>
           </a:p>
@@ -1957,7 +1958,7 @@
             <a:fld id="{1196C21C-BF02-5B43-B1DA-1A862CF808D7}" type="datetimeFigureOut">
               <a:rPr lang="en-US" smtClean="0"/>
               <a:pPr/>
-              <a:t>3/9/18</a:t>
+              <a:t>3/19/18</a:t>
             </a:fld>
             <a:endParaRPr lang="en-US"/>
           </a:p>
@@ -2231,7 +2232,7 @@
             <a:fld id="{1196C21C-BF02-5B43-B1DA-1A862CF808D7}" type="datetimeFigureOut">
               <a:rPr lang="en-US" smtClean="0"/>
               <a:pPr/>
-              <a:t>3/9/18</a:t>
+              <a:t>3/19/18</a:t>
             </a:fld>
             <a:endParaRPr lang="en-US"/>
           </a:p>
@@ -2481,7 +2482,7 @@
             <a:fld id="{1196C21C-BF02-5B43-B1DA-1A862CF808D7}" type="datetimeFigureOut">
               <a:rPr lang="en-US" smtClean="0"/>
               <a:pPr/>
-              <a:t>3/9/18</a:t>
+              <a:t>3/19/18</a:t>
             </a:fld>
             <a:endParaRPr lang="en-US"/>
           </a:p>
@@ -2691,7 +2692,7 @@
             <a:fld id="{1196C21C-BF02-5B43-B1DA-1A862CF808D7}" type="datetimeFigureOut">
               <a:rPr lang="en-US" smtClean="0"/>
               <a:pPr/>
-              <a:t>3/9/18</a:t>
+              <a:t>3/19/18</a:t>
             </a:fld>
             <a:endParaRPr lang="en-US"/>
           </a:p>
@@ -3064,211 +3065,13 @@
       </p:grpSpPr>
       <p:grpSp>
         <p:nvGrpSpPr>
-          <p:cNvPr id="8" name="Group 7"/>
-          <p:cNvGrpSpPr/>
-          <p:nvPr/>
-        </p:nvGrpSpPr>
-        <p:grpSpPr>
-          <a:xfrm>
-            <a:off x="304800" y="457200"/>
-            <a:ext cx="1981200" cy="1600200"/>
-            <a:chOff x="1828800" y="609600"/>
-            <a:chExt cx="2438400" cy="1956810"/>
-          </a:xfrm>
-        </p:grpSpPr>
-        <p:sp>
-          <p:nvSpPr>
-            <p:cNvPr id="4" name="Rectangle 3"/>
-            <p:cNvSpPr/>
-            <p:nvPr/>
-          </p:nvSpPr>
-          <p:spPr>
-            <a:xfrm>
-              <a:off x="1828800" y="609600"/>
-              <a:ext cx="2438400" cy="329190"/>
-            </a:xfrm>
-            <a:prstGeom prst="rect">
-              <a:avLst/>
-            </a:prstGeom>
-            <a:noFill/>
-            <a:ln w="28575" cap="flat" cmpd="sng" algn="ctr">
-              <a:solidFill>
-                <a:schemeClr val="tx1"/>
-              </a:solidFill>
-              <a:prstDash val="solid"/>
-              <a:round/>
-              <a:headEnd type="none" w="med" len="med"/>
-              <a:tailEnd type="none" w="med" len="med"/>
-            </a:ln>
-            <a:effectLst/>
-          </p:spPr>
-          <p:style>
-            <a:lnRef idx="1">
-              <a:schemeClr val="accent1"/>
-            </a:lnRef>
-            <a:fillRef idx="3">
-              <a:schemeClr val="accent1"/>
-            </a:fillRef>
-            <a:effectRef idx="2">
-              <a:schemeClr val="accent1"/>
-            </a:effectRef>
-            <a:fontRef idx="minor">
-              <a:schemeClr val="lt1"/>
-            </a:fontRef>
-          </p:style>
-          <p:txBody>
-            <a:bodyPr rtlCol="0" anchor="ctr"/>
-            <a:lstStyle/>
-            <a:p>
-              <a:pPr algn="ctr"/>
-              <a:r>
-                <a:rPr lang="en-US" sz="1200" dirty="0" smtClean="0">
-                  <a:solidFill>
-                    <a:schemeClr val="tx1"/>
-                  </a:solidFill>
-                </a:rPr>
-                <a:t>Class Name</a:t>
-              </a:r>
-              <a:endParaRPr lang="en-US" sz="1200" dirty="0">
-                <a:solidFill>
-                  <a:schemeClr val="tx1"/>
-                </a:solidFill>
-              </a:endParaRPr>
-            </a:p>
-          </p:txBody>
-        </p:sp>
-        <p:sp>
-          <p:nvSpPr>
-            <p:cNvPr id="6" name="Rectangle 5"/>
-            <p:cNvSpPr/>
-            <p:nvPr/>
-          </p:nvSpPr>
-          <p:spPr>
-            <a:xfrm>
-              <a:off x="1828800" y="938790"/>
-              <a:ext cx="2438400" cy="813810"/>
-            </a:xfrm>
-            <a:prstGeom prst="rect">
-              <a:avLst/>
-            </a:prstGeom>
-            <a:noFill/>
-            <a:ln w="28575" cap="flat" cmpd="sng" algn="ctr">
-              <a:solidFill>
-                <a:schemeClr val="tx1"/>
-              </a:solidFill>
-              <a:prstDash val="solid"/>
-              <a:round/>
-              <a:headEnd type="none" w="med" len="med"/>
-              <a:tailEnd type="none" w="med" len="med"/>
-            </a:ln>
-            <a:effectLst/>
-          </p:spPr>
-          <p:style>
-            <a:lnRef idx="1">
-              <a:schemeClr val="accent1"/>
-            </a:lnRef>
-            <a:fillRef idx="3">
-              <a:schemeClr val="accent1"/>
-            </a:fillRef>
-            <a:effectRef idx="2">
-              <a:schemeClr val="accent1"/>
-            </a:effectRef>
-            <a:fontRef idx="minor">
-              <a:schemeClr val="lt1"/>
-            </a:fontRef>
-          </p:style>
-          <p:txBody>
-            <a:bodyPr rtlCol="0" anchor="ctr"/>
-            <a:lstStyle/>
-            <a:p>
-              <a:pPr algn="ctr"/>
-              <a:r>
-                <a:rPr lang="en-US" sz="1000" dirty="0" smtClean="0">
-                  <a:solidFill>
-                    <a:schemeClr val="tx1"/>
-                  </a:solidFill>
-                </a:rPr>
-                <a:t>Class Methods</a:t>
-              </a:r>
-              <a:endParaRPr lang="en-US" sz="1000" dirty="0">
-                <a:solidFill>
-                  <a:schemeClr val="tx1"/>
-                </a:solidFill>
-              </a:endParaRPr>
-            </a:p>
-          </p:txBody>
-        </p:sp>
-        <p:sp>
-          <p:nvSpPr>
-            <p:cNvPr id="7" name="Rectangle 6"/>
-            <p:cNvSpPr/>
-            <p:nvPr/>
-          </p:nvSpPr>
-          <p:spPr>
-            <a:xfrm>
-              <a:off x="1828800" y="1752600"/>
-              <a:ext cx="2438400" cy="813810"/>
-            </a:xfrm>
-            <a:prstGeom prst="rect">
-              <a:avLst/>
-            </a:prstGeom>
-            <a:noFill/>
-            <a:ln w="28575" cap="flat" cmpd="sng" algn="ctr">
-              <a:solidFill>
-                <a:schemeClr val="tx1"/>
-              </a:solidFill>
-              <a:prstDash val="solid"/>
-              <a:round/>
-              <a:headEnd type="none" w="med" len="med"/>
-              <a:tailEnd type="none" w="med" len="med"/>
-            </a:ln>
-            <a:effectLst/>
-          </p:spPr>
-          <p:style>
-            <a:lnRef idx="1">
-              <a:schemeClr val="accent1"/>
-            </a:lnRef>
-            <a:fillRef idx="3">
-              <a:schemeClr val="accent1"/>
-            </a:fillRef>
-            <a:effectRef idx="2">
-              <a:schemeClr val="accent1"/>
-            </a:effectRef>
-            <a:fontRef idx="minor">
-              <a:schemeClr val="lt1"/>
-            </a:fontRef>
-          </p:style>
-          <p:txBody>
-            <a:bodyPr rtlCol="0" anchor="ctr"/>
-            <a:lstStyle/>
-            <a:p>
-              <a:pPr algn="ctr"/>
-              <a:r>
-                <a:rPr lang="en-US" sz="1000" dirty="0" smtClean="0">
-                  <a:solidFill>
-                    <a:schemeClr val="tx1"/>
-                  </a:solidFill>
-                </a:rPr>
-                <a:t>Class Fields</a:t>
-              </a:r>
-              <a:endParaRPr lang="en-US" sz="1000" dirty="0">
-                <a:solidFill>
-                  <a:schemeClr val="tx1"/>
-                </a:solidFill>
-              </a:endParaRPr>
-            </a:p>
-          </p:txBody>
-        </p:sp>
-      </p:grpSp>
-      <p:grpSp>
-        <p:nvGrpSpPr>
           <p:cNvPr id="9" name="Group 8"/>
           <p:cNvGrpSpPr/>
           <p:nvPr/>
         </p:nvGrpSpPr>
         <p:grpSpPr>
           <a:xfrm>
-            <a:off x="4267200" y="591799"/>
+            <a:off x="6705600" y="2057400"/>
             <a:ext cx="1981200" cy="1600200"/>
             <a:chOff x="1828800" y="609600"/>
             <a:chExt cx="2438400" cy="1956810"/>
@@ -3381,20 +3184,23 @@
             <a:p>
               <a:pPr algn="ctr"/>
               <a:r>
+                <a:rPr lang="en-US" sz="1000" dirty="0" smtClean="0">
+                  <a:solidFill>
+                    <a:schemeClr val="tx1"/>
+                  </a:solidFill>
+                </a:rPr>
+                <a:t>send</a:t>
+              </a:r>
+            </a:p>
+            <a:p>
+              <a:pPr algn="ctr"/>
+              <a:r>
                 <a:rPr lang="en-US" sz="1000" dirty="0" err="1" smtClean="0">
                   <a:solidFill>
                     <a:schemeClr val="tx1"/>
                   </a:solidFill>
                 </a:rPr>
-                <a:t>send(command,target,args</a:t>
-              </a:r>
-              <a:r>
-                <a:rPr lang="en-US" sz="1000" dirty="0" smtClean="0">
-                  <a:solidFill>
-                    <a:schemeClr val="tx1"/>
-                  </a:solidFill>
-                </a:rPr>
-                <a:t>)</a:t>
+                <a:t>sendCommand</a:t>
               </a:r>
               <a:endParaRPr lang="en-US" sz="1000" dirty="0">
                 <a:solidFill>
@@ -3474,8 +3280,8 @@
         </p:nvGrpSpPr>
         <p:grpSpPr>
           <a:xfrm>
-            <a:off x="533400" y="2669498"/>
-            <a:ext cx="1981200" cy="1600200"/>
+            <a:off x="304800" y="2471347"/>
+            <a:ext cx="1981200" cy="1948253"/>
             <a:chOff x="1828800" y="609600"/>
             <a:chExt cx="2438400" cy="1956810"/>
           </a:xfrm>
@@ -3531,7 +3337,7 @@
                     <a:schemeClr val="tx1"/>
                   </a:solidFill>
                 </a:rPr>
-                <a:t>ISystemRegistry</a:t>
+                <a:t>SystemRegistry</a:t>
               </a:r>
               <a:endParaRPr lang="en-US" sz="1200" dirty="0">
                 <a:solidFill>
@@ -3592,7 +3398,18 @@
                     <a:schemeClr val="tx1"/>
                   </a:solidFill>
                 </a:rPr>
-                <a:t>register</a:t>
+                <a:t>Register</a:t>
+              </a:r>
+            </a:p>
+            <a:p>
+              <a:pPr algn="ctr"/>
+              <a:r>
+                <a:rPr lang="en-US" sz="1000" dirty="0" smtClean="0">
+                  <a:solidFill>
+                    <a:schemeClr val="tx1"/>
+                  </a:solidFill>
+                </a:rPr>
+                <a:t>find</a:t>
               </a:r>
               <a:endParaRPr lang="en-US" sz="1000" dirty="0">
                 <a:solidFill>
@@ -3688,8 +3505,8 @@
         </p:nvGrpSpPr>
         <p:grpSpPr>
           <a:xfrm>
-            <a:off x="6858000" y="2471347"/>
-            <a:ext cx="1981200" cy="1600200"/>
+            <a:off x="6705600" y="3962400"/>
+            <a:ext cx="2286000" cy="1600200"/>
             <a:chOff x="1828800" y="609600"/>
             <a:chExt cx="2438400" cy="1956810"/>
           </a:xfrm>
@@ -3745,7 +3562,7 @@
                     <a:schemeClr val="tx1"/>
                   </a:solidFill>
                 </a:rPr>
-                <a:t>RemoteProxy</a:t>
+                <a:t>RespondToCommandHandler</a:t>
               </a:r>
               <a:endParaRPr lang="en-US" sz="1200" dirty="0">
                 <a:solidFill>
@@ -3886,8 +3703,8 @@
         </p:nvGrpSpPr>
         <p:grpSpPr>
           <a:xfrm>
-            <a:off x="3276600" y="4556697"/>
-            <a:ext cx="1981200" cy="1600200"/>
+            <a:off x="2514600" y="3527087"/>
+            <a:ext cx="1524000" cy="1600200"/>
             <a:chOff x="1828800" y="609600"/>
             <a:chExt cx="2438400" cy="1956810"/>
           </a:xfrm>
@@ -3938,12 +3755,12 @@
             <a:p>
               <a:pPr algn="ctr"/>
               <a:r>
-                <a:rPr lang="en-US" sz="1200" dirty="0" err="1" smtClean="0">
+                <a:rPr lang="en-US" sz="1200" dirty="0" smtClean="0">
                   <a:solidFill>
                     <a:schemeClr val="tx1"/>
                   </a:solidFill>
                 </a:rPr>
-                <a:t>LocalProxy</a:t>
+                <a:t>Proxy</a:t>
               </a:r>
               <a:endParaRPr lang="en-US" sz="1200" dirty="0">
                 <a:solidFill>
@@ -4141,7 +3958,7 @@
                     <a:schemeClr val="tx1"/>
                   </a:solidFill>
                 </a:rPr>
-                <a:t>IMessageHandler</a:t>
+                <a:t>MessageHandler</a:t>
               </a:r>
               <a:endParaRPr lang="en-US" sz="1200" dirty="0">
                 <a:solidFill>
@@ -4202,7 +4019,7 @@
                     <a:schemeClr val="tx1"/>
                   </a:solidFill>
                 </a:rPr>
-                <a:t>register</a:t>
+                <a:t>handle</a:t>
               </a:r>
               <a:endParaRPr lang="en-US" sz="1000" dirty="0">
                 <a:solidFill>
@@ -4292,100 +4109,25 @@
       </p:grpSp>
       <p:cxnSp>
         <p:nvCxnSpPr>
-          <p:cNvPr id="36" name="Elbow Connector 35"/>
-          <p:cNvCxnSpPr>
-            <a:stCxn id="15" idx="3"/>
-            <a:endCxn id="24" idx="1"/>
-          </p:cNvCxnSpPr>
+          <p:cNvPr id="43" name="Straight Arrow Connector 42"/>
+          <p:cNvCxnSpPr/>
           <p:nvPr/>
         </p:nvCxnSpPr>
         <p:spPr>
           <a:xfrm>
-            <a:off x="2514600" y="3271447"/>
-            <a:ext cx="762000" cy="1419849"/>
-          </a:xfrm>
-          <a:prstGeom prst="bentConnector3">
-            <a:avLst>
-              <a:gd name="adj1" fmla="val 50000"/>
-            </a:avLst>
-          </a:prstGeom>
-          <a:ln>
-            <a:tailEnd type="arrow"/>
-          </a:ln>
-        </p:spPr>
-        <p:style>
-          <a:lnRef idx="2">
-            <a:schemeClr val="accent1"/>
-          </a:lnRef>
-          <a:fillRef idx="0">
-            <a:schemeClr val="accent1"/>
-          </a:fillRef>
-          <a:effectRef idx="1">
-            <a:schemeClr val="accent1"/>
-          </a:effectRef>
-          <a:fontRef idx="minor">
-            <a:schemeClr val="tx1"/>
-          </a:fontRef>
-        </p:style>
-      </p:cxnSp>
-      <p:cxnSp>
-        <p:nvCxnSpPr>
-          <p:cNvPr id="41" name="Elbow Connector 40"/>
-          <p:cNvCxnSpPr>
-            <a:stCxn id="24" idx="0"/>
-            <a:endCxn id="34" idx="2"/>
-          </p:cNvCxnSpPr>
-          <p:nvPr/>
-        </p:nvCxnSpPr>
-        <p:spPr>
-          <a:xfrm rot="5400000" flipH="1" flipV="1">
-            <a:off x="4519925" y="3818822"/>
-            <a:ext cx="485150" cy="990600"/>
-          </a:xfrm>
-          <a:prstGeom prst="bentConnector3">
-            <a:avLst>
-              <a:gd name="adj1" fmla="val 50000"/>
-            </a:avLst>
-          </a:prstGeom>
-          <a:ln>
-            <a:tailEnd type="arrow"/>
-          </a:ln>
-        </p:spPr>
-        <p:style>
-          <a:lnRef idx="2">
-            <a:schemeClr val="accent1"/>
-          </a:lnRef>
-          <a:fillRef idx="0">
-            <a:schemeClr val="accent1"/>
-          </a:fillRef>
-          <a:effectRef idx="1">
-            <a:schemeClr val="accent1"/>
-          </a:effectRef>
-          <a:fontRef idx="minor">
-            <a:schemeClr val="tx1"/>
-          </a:fontRef>
-        </p:style>
-      </p:cxnSp>
-      <p:cxnSp>
-        <p:nvCxnSpPr>
-          <p:cNvPr id="43" name="Straight Arrow Connector 42"/>
-          <p:cNvCxnSpPr>
-            <a:stCxn id="32" idx="0"/>
-            <a:endCxn id="12" idx="2"/>
-          </p:cNvCxnSpPr>
-          <p:nvPr/>
-        </p:nvCxnSpPr>
-        <p:spPr>
-          <a:xfrm rot="5400000" flipH="1" flipV="1">
-            <a:off x="5118126" y="2331673"/>
-            <a:ext cx="279348" cy="1588"/>
+            <a:off x="6248402" y="2590799"/>
+            <a:ext cx="457199" cy="1"/>
           </a:xfrm>
           <a:prstGeom prst="straightConnector1">
             <a:avLst/>
           </a:prstGeom>
           <a:ln>
+            <a:solidFill>
+              <a:schemeClr val="tx1"/>
+            </a:solidFill>
             <a:tailEnd type="arrow"/>
           </a:ln>
+          <a:effectLst/>
         </p:spPr>
         <p:style>
           <a:lnRef idx="2">
@@ -4409,22 +4151,23 @@
           <p:nvPr/>
         </p:nvCxnSpPr>
         <p:spPr>
-          <a:xfrm>
-            <a:off x="6248400" y="2938696"/>
-            <a:ext cx="609600" cy="1588"/>
+          <a:xfrm flipV="1">
+            <a:off x="6271668" y="4037167"/>
+            <a:ext cx="433932" cy="1433"/>
           </a:xfrm>
           <a:prstGeom prst="straightConnector1">
             <a:avLst/>
           </a:prstGeom>
           <a:ln w="25400" cap="flat" cmpd="sng" algn="ctr">
             <a:solidFill>
-              <a:schemeClr val="accent1"/>
+              <a:schemeClr val="tx1"/>
             </a:solidFill>
             <a:prstDash val="sysDash"/>
             <a:round/>
             <a:headEnd type="none" w="med" len="med"/>
             <a:tailEnd type="arrow" w="med" len="med"/>
           </a:ln>
+          <a:effectLst/>
         </p:spPr>
         <p:style>
           <a:lnRef idx="2">
@@ -4441,204 +4184,395 @@
           </a:fontRef>
         </p:style>
       </p:cxnSp>
-      <p:grpSp>
-        <p:nvGrpSpPr>
-          <p:cNvPr id="46" name="Group 45"/>
-          <p:cNvGrpSpPr/>
+      <p:cxnSp>
+        <p:nvCxnSpPr>
+          <p:cNvPr id="37" name="Straight Arrow Connector 36"/>
+          <p:cNvCxnSpPr>
+            <a:endCxn id="24" idx="1"/>
+          </p:cNvCxnSpPr>
           <p:nvPr/>
-        </p:nvGrpSpPr>
-        <p:grpSpPr>
+        </p:nvCxnSpPr>
+        <p:spPr>
           <a:xfrm>
-            <a:off x="533400" y="4691296"/>
-            <a:ext cx="1981200" cy="1600200"/>
-            <a:chOff x="1828800" y="609600"/>
-            <a:chExt cx="2438400" cy="1956810"/>
-          </a:xfrm>
-        </p:grpSpPr>
-        <p:sp>
-          <p:nvSpPr>
-            <p:cNvPr id="47" name="Rectangle 46"/>
-            <p:cNvSpPr/>
-            <p:nvPr/>
-          </p:nvSpPr>
-          <p:spPr>
-            <a:xfrm>
-              <a:off x="1828800" y="609600"/>
-              <a:ext cx="2438400" cy="329190"/>
-            </a:xfrm>
-            <a:prstGeom prst="rect">
-              <a:avLst/>
-            </a:prstGeom>
-            <a:noFill/>
-            <a:ln w="28575" cap="flat" cmpd="sng" algn="ctr">
-              <a:solidFill>
-                <a:schemeClr val="tx1"/>
-              </a:solidFill>
-              <a:prstDash val="solid"/>
-              <a:round/>
-              <a:headEnd type="none" w="med" len="med"/>
-              <a:tailEnd type="none" w="med" len="med"/>
-            </a:ln>
-            <a:effectLst/>
-          </p:spPr>
-          <p:style>
-            <a:lnRef idx="1">
-              <a:schemeClr val="accent1"/>
-            </a:lnRef>
-            <a:fillRef idx="3">
-              <a:schemeClr val="accent1"/>
-            </a:fillRef>
-            <a:effectRef idx="2">
-              <a:schemeClr val="accent1"/>
-            </a:effectRef>
-            <a:fontRef idx="minor">
-              <a:schemeClr val="lt1"/>
-            </a:fontRef>
-          </p:style>
-          <p:txBody>
-            <a:bodyPr rtlCol="0" anchor="ctr"/>
-            <a:lstStyle/>
-            <a:p>
-              <a:pPr algn="ctr"/>
-              <a:r>
-                <a:rPr lang="en-US" sz="1200" dirty="0" smtClean="0">
-                  <a:solidFill>
-                    <a:schemeClr val="tx1"/>
-                  </a:solidFill>
-                </a:rPr>
-                <a:t>Class Name</a:t>
-              </a:r>
-              <a:endParaRPr lang="en-US" sz="1200" dirty="0">
-                <a:solidFill>
-                  <a:schemeClr val="tx1"/>
-                </a:solidFill>
-              </a:endParaRPr>
-            </a:p>
-          </p:txBody>
-        </p:sp>
-        <p:sp>
-          <p:nvSpPr>
-            <p:cNvPr id="48" name="Rectangle 47"/>
-            <p:cNvSpPr/>
-            <p:nvPr/>
-          </p:nvSpPr>
-          <p:spPr>
-            <a:xfrm>
-              <a:off x="1828800" y="938790"/>
-              <a:ext cx="2438400" cy="813810"/>
-            </a:xfrm>
-            <a:prstGeom prst="rect">
-              <a:avLst/>
-            </a:prstGeom>
-            <a:noFill/>
-            <a:ln w="28575" cap="flat" cmpd="sng" algn="ctr">
-              <a:solidFill>
-                <a:schemeClr val="tx1"/>
-              </a:solidFill>
-              <a:prstDash val="solid"/>
-              <a:round/>
-              <a:headEnd type="none" w="med" len="med"/>
-              <a:tailEnd type="none" w="med" len="med"/>
-            </a:ln>
-            <a:effectLst/>
-          </p:spPr>
-          <p:style>
-            <a:lnRef idx="1">
-              <a:schemeClr val="accent1"/>
-            </a:lnRef>
-            <a:fillRef idx="3">
-              <a:schemeClr val="accent1"/>
-            </a:fillRef>
-            <a:effectRef idx="2">
-              <a:schemeClr val="accent1"/>
-            </a:effectRef>
-            <a:fontRef idx="minor">
-              <a:schemeClr val="lt1"/>
-            </a:fontRef>
-          </p:style>
-          <p:txBody>
-            <a:bodyPr rtlCol="0" anchor="ctr"/>
-            <a:lstStyle/>
-            <a:p>
-              <a:pPr algn="ctr"/>
-              <a:r>
-                <a:rPr lang="en-US" sz="1000" dirty="0" smtClean="0">
-                  <a:solidFill>
-                    <a:schemeClr val="tx1"/>
-                  </a:solidFill>
-                </a:rPr>
-                <a:t>Class Methods</a:t>
-              </a:r>
-              <a:endParaRPr lang="en-US" sz="1000" dirty="0">
-                <a:solidFill>
-                  <a:schemeClr val="tx1"/>
-                </a:solidFill>
-              </a:endParaRPr>
-            </a:p>
-          </p:txBody>
-        </p:sp>
-        <p:sp>
-          <p:nvSpPr>
-            <p:cNvPr id="49" name="Rectangle 48"/>
-            <p:cNvSpPr/>
-            <p:nvPr/>
-          </p:nvSpPr>
-          <p:spPr>
-            <a:xfrm>
-              <a:off x="1828800" y="1752600"/>
-              <a:ext cx="2438400" cy="813810"/>
-            </a:xfrm>
-            <a:prstGeom prst="rect">
-              <a:avLst/>
-            </a:prstGeom>
-            <a:noFill/>
-            <a:ln w="28575" cap="flat" cmpd="sng" algn="ctr">
-              <a:solidFill>
-                <a:schemeClr val="tx1"/>
-              </a:solidFill>
-              <a:prstDash val="solid"/>
-              <a:round/>
-              <a:headEnd type="none" w="med" len="med"/>
-              <a:tailEnd type="none" w="med" len="med"/>
-            </a:ln>
-            <a:effectLst/>
-          </p:spPr>
-          <p:style>
-            <a:lnRef idx="1">
-              <a:schemeClr val="accent1"/>
-            </a:lnRef>
-            <a:fillRef idx="3">
-              <a:schemeClr val="accent1"/>
-            </a:fillRef>
-            <a:effectRef idx="2">
-              <a:schemeClr val="accent1"/>
-            </a:effectRef>
-            <a:fontRef idx="minor">
-              <a:schemeClr val="lt1"/>
-            </a:fontRef>
-          </p:style>
-          <p:txBody>
-            <a:bodyPr rtlCol="0" anchor="ctr"/>
-            <a:lstStyle/>
-            <a:p>
-              <a:pPr algn="ctr"/>
-              <a:r>
-                <a:rPr lang="en-US" sz="1000" dirty="0" smtClean="0">
-                  <a:solidFill>
-                    <a:schemeClr val="tx1"/>
-                  </a:solidFill>
-                </a:rPr>
-                <a:t>Class Fields</a:t>
-              </a:r>
-              <a:endParaRPr lang="en-US" sz="1000" dirty="0">
-                <a:solidFill>
-                  <a:schemeClr val="tx1"/>
-                </a:solidFill>
-              </a:endParaRPr>
-            </a:p>
-          </p:txBody>
-        </p:sp>
-      </p:grpSp>
+            <a:off x="2286000" y="3657600"/>
+            <a:ext cx="228600" cy="4086"/>
+          </a:xfrm>
+          <a:prstGeom prst="straightConnector1">
+            <a:avLst/>
+          </a:prstGeom>
+          <a:ln w="25400" cap="flat" cmpd="sng" algn="ctr">
+            <a:solidFill>
+              <a:schemeClr val="tx1"/>
+            </a:solidFill>
+            <a:prstDash val="sysDash"/>
+            <a:round/>
+            <a:headEnd type="none" w="med" len="med"/>
+            <a:tailEnd type="arrow" w="med" len="med"/>
+          </a:ln>
+          <a:effectLst/>
+        </p:spPr>
+        <p:style>
+          <a:lnRef idx="2">
+            <a:schemeClr val="accent1"/>
+          </a:lnRef>
+          <a:fillRef idx="0">
+            <a:schemeClr val="accent1"/>
+          </a:fillRef>
+          <a:effectRef idx="1">
+            <a:schemeClr val="accent1"/>
+          </a:effectRef>
+          <a:fontRef idx="minor">
+            <a:schemeClr val="tx1"/>
+          </a:fontRef>
+        </p:style>
+      </p:cxnSp>
+      <p:cxnSp>
+        <p:nvCxnSpPr>
+          <p:cNvPr id="38" name="Straight Arrow Connector 37"/>
+          <p:cNvCxnSpPr>
+            <a:stCxn id="14" idx="3"/>
+          </p:cNvCxnSpPr>
+          <p:nvPr/>
+        </p:nvCxnSpPr>
+        <p:spPr>
+          <a:xfrm>
+            <a:off x="2286000" y="2635222"/>
+            <a:ext cx="1981200" cy="2502"/>
+          </a:xfrm>
+          <a:prstGeom prst="straightConnector1">
+            <a:avLst/>
+          </a:prstGeom>
+          <a:ln>
+            <a:solidFill>
+              <a:schemeClr val="tx1"/>
+            </a:solidFill>
+            <a:tailEnd type="arrow"/>
+          </a:ln>
+          <a:effectLst/>
+        </p:spPr>
+        <p:style>
+          <a:lnRef idx="2">
+            <a:schemeClr val="accent1"/>
+          </a:lnRef>
+          <a:fillRef idx="0">
+            <a:schemeClr val="accent1"/>
+          </a:fillRef>
+          <a:effectRef idx="1">
+            <a:schemeClr val="accent1"/>
+          </a:effectRef>
+          <a:fontRef idx="minor">
+            <a:schemeClr val="tx1"/>
+          </a:fontRef>
+        </p:style>
+      </p:cxnSp>
+      <p:sp>
+        <p:nvSpPr>
+          <p:cNvPr id="29" name="TextBox 28"/>
+          <p:cNvSpPr txBox="1"/>
+          <p:nvPr/>
+        </p:nvSpPr>
+        <p:spPr>
+          <a:xfrm>
+            <a:off x="914400" y="5125699"/>
+            <a:ext cx="1795646" cy="1200329"/>
+          </a:xfrm>
+          <a:prstGeom prst="rect">
+            <a:avLst/>
+          </a:prstGeom>
+          <a:noFill/>
+        </p:spPr>
+        <p:txBody>
+          <a:bodyPr wrap="none" rtlCol="0">
+            <a:spAutoFit/>
+          </a:bodyPr>
+          <a:lstStyle/>
+          <a:p>
+            <a:r>
+              <a:rPr lang="en-US" dirty="0" smtClean="0"/>
+              <a:t>Inheritance</a:t>
+            </a:r>
+          </a:p>
+          <a:p>
+            <a:r>
+              <a:rPr lang="en-US" dirty="0" smtClean="0"/>
+              <a:t>Object Reference</a:t>
+            </a:r>
+          </a:p>
+          <a:p>
+            <a:r>
+              <a:rPr lang="en-US" dirty="0" smtClean="0"/>
+              <a:t>Creates</a:t>
+            </a:r>
+          </a:p>
+          <a:p>
+            <a:r>
+              <a:rPr lang="en-US" dirty="0" smtClean="0"/>
+              <a:t>Aggregation</a:t>
+            </a:r>
+          </a:p>
+        </p:txBody>
+      </p:sp>
+      <p:cxnSp>
+        <p:nvCxnSpPr>
+          <p:cNvPr id="36" name="Straight Arrow Connector 35"/>
+          <p:cNvCxnSpPr/>
+          <p:nvPr/>
+        </p:nvCxnSpPr>
+        <p:spPr>
+          <a:xfrm>
+            <a:off x="304800" y="5894131"/>
+            <a:ext cx="609600" cy="1588"/>
+          </a:xfrm>
+          <a:prstGeom prst="straightConnector1">
+            <a:avLst/>
+          </a:prstGeom>
+          <a:ln w="25400" cap="flat" cmpd="sng" algn="ctr">
+            <a:solidFill>
+              <a:schemeClr val="tx1"/>
+            </a:solidFill>
+            <a:prstDash val="sysDash"/>
+            <a:round/>
+            <a:headEnd type="none" w="med" len="med"/>
+            <a:tailEnd type="arrow" w="med" len="med"/>
+          </a:ln>
+          <a:effectLst/>
+        </p:spPr>
+        <p:style>
+          <a:lnRef idx="2">
+            <a:schemeClr val="accent1"/>
+          </a:lnRef>
+          <a:fillRef idx="0">
+            <a:schemeClr val="accent1"/>
+          </a:fillRef>
+          <a:effectRef idx="1">
+            <a:schemeClr val="accent1"/>
+          </a:effectRef>
+          <a:fontRef idx="minor">
+            <a:schemeClr val="tx1"/>
+          </a:fontRef>
+        </p:style>
+      </p:cxnSp>
+      <p:cxnSp>
+        <p:nvCxnSpPr>
+          <p:cNvPr id="39" name="Straight Arrow Connector 38"/>
+          <p:cNvCxnSpPr/>
+          <p:nvPr/>
+        </p:nvCxnSpPr>
+        <p:spPr>
+          <a:xfrm>
+            <a:off x="304800" y="5589331"/>
+            <a:ext cx="609600" cy="1588"/>
+          </a:xfrm>
+          <a:prstGeom prst="straightConnector1">
+            <a:avLst/>
+          </a:prstGeom>
+          <a:ln w="25400" cap="flat" cmpd="sng" algn="ctr">
+            <a:solidFill>
+              <a:schemeClr val="tx1"/>
+            </a:solidFill>
+            <a:prstDash val="solid"/>
+            <a:round/>
+            <a:headEnd type="none" w="med" len="med"/>
+            <a:tailEnd type="arrow" w="med" len="med"/>
+          </a:ln>
+          <a:effectLst/>
+        </p:spPr>
+        <p:style>
+          <a:lnRef idx="2">
+            <a:schemeClr val="accent1"/>
+          </a:lnRef>
+          <a:fillRef idx="0">
+            <a:schemeClr val="accent1"/>
+          </a:fillRef>
+          <a:effectRef idx="1">
+            <a:schemeClr val="accent1"/>
+          </a:effectRef>
+          <a:fontRef idx="minor">
+            <a:schemeClr val="tx1"/>
+          </a:fontRef>
+        </p:style>
+      </p:cxnSp>
+      <p:cxnSp>
+        <p:nvCxnSpPr>
+          <p:cNvPr id="40" name="Straight Arrow Connector 39"/>
+          <p:cNvCxnSpPr/>
+          <p:nvPr/>
+        </p:nvCxnSpPr>
+        <p:spPr>
+          <a:xfrm rot="5400000" flipH="1" flipV="1">
+            <a:off x="454143" y="5382734"/>
+            <a:ext cx="279348" cy="1588"/>
+          </a:xfrm>
+          <a:prstGeom prst="straightConnector1">
+            <a:avLst/>
+          </a:prstGeom>
+          <a:ln>
+            <a:solidFill>
+              <a:schemeClr val="tx1"/>
+            </a:solidFill>
+            <a:tailEnd type="arrow"/>
+          </a:ln>
+          <a:effectLst/>
+        </p:spPr>
+        <p:style>
+          <a:lnRef idx="2">
+            <a:schemeClr val="accent1"/>
+          </a:lnRef>
+          <a:fillRef idx="0">
+            <a:schemeClr val="accent1"/>
+          </a:fillRef>
+          <a:effectRef idx="1">
+            <a:schemeClr val="accent1"/>
+          </a:effectRef>
+          <a:fontRef idx="minor">
+            <a:schemeClr val="tx1"/>
+          </a:fontRef>
+        </p:style>
+      </p:cxnSp>
+      <p:cxnSp>
+        <p:nvCxnSpPr>
+          <p:cNvPr id="41" name="Straight Arrow Connector 40"/>
+          <p:cNvCxnSpPr/>
+          <p:nvPr/>
+        </p:nvCxnSpPr>
+        <p:spPr>
+          <a:xfrm>
+            <a:off x="305572" y="6172379"/>
+            <a:ext cx="609600" cy="1588"/>
+          </a:xfrm>
+          <a:prstGeom prst="straightConnector1">
+            <a:avLst/>
+          </a:prstGeom>
+          <a:ln w="25400" cap="flat" cmpd="sng" algn="ctr">
+            <a:solidFill>
+              <a:schemeClr val="tx1"/>
+            </a:solidFill>
+            <a:prstDash val="solid"/>
+            <a:round/>
+            <a:headEnd type="diamond" w="med" len="med"/>
+            <a:tailEnd type="arrow" w="med" len="med"/>
+          </a:ln>
+          <a:effectLst/>
+        </p:spPr>
+        <p:style>
+          <a:lnRef idx="2">
+            <a:schemeClr val="accent1"/>
+          </a:lnRef>
+          <a:fillRef idx="0">
+            <a:schemeClr val="accent1"/>
+          </a:fillRef>
+          <a:effectRef idx="1">
+            <a:schemeClr val="accent1"/>
+          </a:effectRef>
+          <a:fontRef idx="minor">
+            <a:schemeClr val="tx1"/>
+          </a:fontRef>
+        </p:style>
+      </p:cxnSp>
+      <p:sp>
+        <p:nvSpPr>
+          <p:cNvPr id="49" name="TextBox 48"/>
+          <p:cNvSpPr txBox="1"/>
+          <p:nvPr/>
+        </p:nvSpPr>
+        <p:spPr>
+          <a:xfrm>
+            <a:off x="3581400" y="1383268"/>
+            <a:ext cx="2529170" cy="369332"/>
+          </a:xfrm>
+          <a:prstGeom prst="rect">
+            <a:avLst/>
+          </a:prstGeom>
+          <a:noFill/>
+        </p:spPr>
+        <p:txBody>
+          <a:bodyPr wrap="none" rtlCol="0">
+            <a:spAutoFit/>
+          </a:bodyPr>
+          <a:lstStyle/>
+          <a:p>
+            <a:r>
+              <a:rPr lang="en-US" b="1" dirty="0" smtClean="0"/>
+              <a:t>Simplified Class Diagram</a:t>
+            </a:r>
+            <a:endParaRPr lang="en-US" b="1" dirty="0"/>
+          </a:p>
+        </p:txBody>
+      </p:sp>
+      <p:cxnSp>
+        <p:nvCxnSpPr>
+          <p:cNvPr id="53" name="Straight Arrow Connector 52"/>
+          <p:cNvCxnSpPr/>
+          <p:nvPr/>
+        </p:nvCxnSpPr>
+        <p:spPr>
+          <a:xfrm>
+            <a:off x="3993442" y="3796284"/>
+            <a:ext cx="273758" cy="1"/>
+          </a:xfrm>
+          <a:prstGeom prst="straightConnector1">
+            <a:avLst/>
+          </a:prstGeom>
+          <a:ln>
+            <a:solidFill>
+              <a:schemeClr val="tx1"/>
+            </a:solidFill>
+            <a:tailEnd type="arrow"/>
+          </a:ln>
+          <a:effectLst/>
+        </p:spPr>
+        <p:style>
+          <a:lnRef idx="2">
+            <a:schemeClr val="accent1"/>
+          </a:lnRef>
+          <a:fillRef idx="0">
+            <a:schemeClr val="accent1"/>
+          </a:fillRef>
+          <a:effectRef idx="1">
+            <a:schemeClr val="accent1"/>
+          </a:effectRef>
+          <a:fontRef idx="minor">
+            <a:schemeClr val="tx1"/>
+          </a:fontRef>
+        </p:style>
+      </p:cxnSp>
+      <p:cxnSp>
+        <p:nvCxnSpPr>
+          <p:cNvPr id="62" name="Straight Arrow Connector 61"/>
+          <p:cNvCxnSpPr/>
+          <p:nvPr/>
+        </p:nvCxnSpPr>
+        <p:spPr>
+          <a:xfrm rot="10800000">
+            <a:off x="2286002" y="2992099"/>
+            <a:ext cx="1981199" cy="3"/>
+          </a:xfrm>
+          <a:prstGeom prst="straightConnector1">
+            <a:avLst/>
+          </a:prstGeom>
+          <a:ln>
+            <a:solidFill>
+              <a:schemeClr val="tx1"/>
+            </a:solidFill>
+            <a:tailEnd type="arrow"/>
+          </a:ln>
+          <a:effectLst/>
+        </p:spPr>
+        <p:style>
+          <a:lnRef idx="2">
+            <a:schemeClr val="accent1"/>
+          </a:lnRef>
+          <a:fillRef idx="0">
+            <a:schemeClr val="accent1"/>
+          </a:fillRef>
+          <a:effectRef idx="1">
+            <a:schemeClr val="accent1"/>
+          </a:effectRef>
+          <a:fontRef idx="minor">
+            <a:schemeClr val="tx1"/>
+          </a:fontRef>
+        </p:style>
+      </p:cxnSp>
     </p:spTree>
   </p:cSld>
   <p:clrMapOvr>
@@ -4738,7 +4672,7 @@
         </p:nvSpPr>
         <p:spPr>
           <a:xfrm>
-            <a:off x="2438400" y="1991280"/>
+            <a:off x="2819400" y="1991280"/>
             <a:ext cx="1752600" cy="369332"/>
           </a:xfrm>
           <a:prstGeom prst="rect">
@@ -4753,8 +4687,8 @@
           <a:lstStyle/>
           <a:p>
             <a:r>
-              <a:rPr lang="en-US" dirty="0" err="1" smtClean="0"/>
-              <a:t>SystemRegistry</a:t>
+              <a:rPr lang="en-US" dirty="0" smtClean="0"/>
+              <a:t>Registry</a:t>
             </a:r>
             <a:endParaRPr lang="en-US" dirty="0"/>
           </a:p>
@@ -4768,7 +4702,7 @@
         </p:nvSpPr>
         <p:spPr>
           <a:xfrm>
-            <a:off x="4419600" y="1991280"/>
+            <a:off x="4724400" y="1991280"/>
             <a:ext cx="1752600" cy="369332"/>
           </a:xfrm>
           <a:prstGeom prst="rect">
@@ -4783,8 +4717,8 @@
           <a:lstStyle/>
           <a:p>
             <a:r>
-              <a:rPr lang="en-US" dirty="0" err="1" smtClean="0"/>
-              <a:t>LocalProxy</a:t>
+              <a:rPr lang="en-US" dirty="0" smtClean="0"/>
+              <a:t>Proxy</a:t>
             </a:r>
             <a:endParaRPr lang="en-US" dirty="0"/>
           </a:p>
@@ -5261,7 +5195,7 @@
         </p:nvSpPr>
         <p:spPr>
           <a:xfrm>
-            <a:off x="2558912" y="914400"/>
+            <a:off x="2054657" y="1288702"/>
             <a:ext cx="4803343" cy="369332"/>
           </a:xfrm>
           <a:prstGeom prst="rect">
@@ -5322,7 +5256,7 @@
         <p:spPr>
           <a:xfrm>
             <a:off x="1371600" y="2971800"/>
-            <a:ext cx="1447800" cy="276999"/>
+            <a:ext cx="1752600" cy="276999"/>
           </a:xfrm>
           <a:prstGeom prst="rect">
             <a:avLst/>
@@ -5337,7 +5271,15 @@
           <a:p>
             <a:r>
               <a:rPr lang="en-US" sz="1200" dirty="0" smtClean="0"/>
-              <a:t>Method call</a:t>
+              <a:t>Blocking m</a:t>
+            </a:r>
+            <a:r>
+              <a:rPr lang="en-US" sz="1200" dirty="0" smtClean="0"/>
+              <a:t>ethod </a:t>
+            </a:r>
+            <a:r>
+              <a:rPr lang="en-US" sz="1200" dirty="0" smtClean="0"/>
+              <a:t>call</a:t>
             </a:r>
             <a:endParaRPr lang="en-US" sz="1200" dirty="0"/>
           </a:p>
@@ -5366,8 +5308,8 @@
           <a:lstStyle/>
           <a:p>
             <a:r>
-              <a:rPr lang="en-US" sz="1200" dirty="0" smtClean="0"/>
-              <a:t>send</a:t>
+              <a:rPr lang="en-US" sz="1200" dirty="0" err="1" smtClean="0"/>
+              <a:t>sendCommand</a:t>
             </a:r>
             <a:endParaRPr lang="en-US" sz="1200" dirty="0"/>
           </a:p>
@@ -5466,7 +5408,7 @@
         </p:nvSpPr>
         <p:spPr>
           <a:xfrm>
-            <a:off x="4038600" y="1429584"/>
+            <a:off x="6096000" y="1485831"/>
             <a:ext cx="1752600" cy="369332"/>
           </a:xfrm>
           <a:prstGeom prst="rect">
@@ -5481,8 +5423,8 @@
           <a:lstStyle/>
           <a:p>
             <a:r>
-              <a:rPr lang="en-US" dirty="0" err="1" smtClean="0"/>
-              <a:t>SystemRegistry</a:t>
+              <a:rPr lang="en-US" dirty="0" smtClean="0"/>
+              <a:t>Registry</a:t>
             </a:r>
             <a:endParaRPr lang="en-US" dirty="0"/>
           </a:p>
@@ -5496,7 +5438,7 @@
         </p:nvSpPr>
         <p:spPr>
           <a:xfrm>
-            <a:off x="76200" y="1337251"/>
+            <a:off x="76200" y="1143000"/>
             <a:ext cx="1752600" cy="646331"/>
           </a:xfrm>
           <a:prstGeom prst="rect">
@@ -5556,8 +5498,8 @@
         </p:nvSpPr>
         <p:spPr>
           <a:xfrm>
-            <a:off x="5943600" y="1429584"/>
-            <a:ext cx="1752600" cy="369332"/>
+            <a:off x="3962400" y="1182469"/>
+            <a:ext cx="1752600" cy="646331"/>
           </a:xfrm>
           <a:prstGeom prst="rect">
             <a:avLst/>
@@ -5572,7 +5514,7 @@
           <a:p>
             <a:r>
               <a:rPr lang="en-US" dirty="0" err="1" smtClean="0"/>
-              <a:t>RemoteProxy</a:t>
+              <a:t>RespondToCommandHandler</a:t>
             </a:r>
             <a:endParaRPr lang="en-US" dirty="0"/>
           </a:p>
@@ -5688,7 +5630,7 @@
         </p:nvCxnSpPr>
         <p:spPr>
           <a:xfrm rot="5400000">
-            <a:off x="3088879" y="3619103"/>
+            <a:off x="4920855" y="3619103"/>
             <a:ext cx="3274218" cy="3176"/>
           </a:xfrm>
           <a:prstGeom prst="line">
@@ -5724,7 +5666,7 @@
         </p:nvCxnSpPr>
         <p:spPr>
           <a:xfrm rot="5400000">
-            <a:off x="4917679" y="3619103"/>
+            <a:off x="3009503" y="3619103"/>
             <a:ext cx="3274218" cy="3176"/>
           </a:xfrm>
           <a:prstGeom prst="line">
@@ -5827,43 +5769,6 @@
       </p:cxnSp>
       <p:cxnSp>
         <p:nvCxnSpPr>
-          <p:cNvPr id="15" name="Straight Arrow Connector 14"/>
-          <p:cNvCxnSpPr/>
-          <p:nvPr/>
-        </p:nvCxnSpPr>
-        <p:spPr>
-          <a:xfrm flipV="1">
-            <a:off x="2746377" y="2617163"/>
-            <a:ext cx="1978023" cy="1588"/>
-          </a:xfrm>
-          <a:prstGeom prst="straightConnector1">
-            <a:avLst/>
-          </a:prstGeom>
-          <a:ln>
-            <a:solidFill>
-              <a:srgbClr val="000000"/>
-            </a:solidFill>
-            <a:tailEnd type="arrow"/>
-          </a:ln>
-          <a:effectLst/>
-        </p:spPr>
-        <p:style>
-          <a:lnRef idx="2">
-            <a:schemeClr val="accent1"/>
-          </a:lnRef>
-          <a:fillRef idx="0">
-            <a:schemeClr val="accent1"/>
-          </a:fillRef>
-          <a:effectRef idx="1">
-            <a:schemeClr val="accent1"/>
-          </a:effectRef>
-          <a:fontRef idx="minor">
-            <a:schemeClr val="tx1"/>
-          </a:fontRef>
-        </p:style>
-      </p:cxnSp>
-      <p:cxnSp>
-        <p:nvCxnSpPr>
           <p:cNvPr id="19" name="Straight Arrow Connector 18"/>
           <p:cNvCxnSpPr/>
           <p:nvPr/>
@@ -5871,7 +5776,7 @@
         <p:spPr>
           <a:xfrm flipV="1">
             <a:off x="2707482" y="3150563"/>
-            <a:ext cx="3845718" cy="1588"/>
+            <a:ext cx="1940718" cy="1588"/>
           </a:xfrm>
           <a:prstGeom prst="straightConnector1">
             <a:avLst/>
@@ -5907,8 +5812,8 @@
         </p:nvCxnSpPr>
         <p:spPr>
           <a:xfrm flipV="1">
-            <a:off x="6556376" y="3302963"/>
-            <a:ext cx="1825624" cy="1588"/>
+            <a:off x="4645024" y="4265612"/>
+            <a:ext cx="3740152" cy="1588"/>
           </a:xfrm>
           <a:prstGeom prst="straightConnector1">
             <a:avLst/>
@@ -5944,8 +5849,8 @@
         </p:nvCxnSpPr>
         <p:spPr>
           <a:xfrm rot="10800000">
-            <a:off x="2746378" y="3761751"/>
-            <a:ext cx="3806823" cy="1588"/>
+            <a:off x="2746380" y="4572000"/>
+            <a:ext cx="1898645" cy="1588"/>
           </a:xfrm>
           <a:prstGeom prst="straightConnector1">
             <a:avLst/>
@@ -5981,7 +5886,7 @@
         </p:nvCxnSpPr>
         <p:spPr>
           <a:xfrm rot="10800000" flipV="1">
-            <a:off x="1066007" y="3990350"/>
+            <a:off x="1066007" y="4800599"/>
             <a:ext cx="1680373" cy="1"/>
           </a:xfrm>
           <a:prstGeom prst="straightConnector1">
@@ -6064,7 +5969,7 @@
           <a:p>
             <a:r>
               <a:rPr lang="en-US" sz="1200" dirty="0" smtClean="0"/>
-              <a:t>handle</a:t>
+              <a:t>new</a:t>
             </a:r>
             <a:endParaRPr lang="en-US" sz="1200" dirty="0"/>
           </a:p>
@@ -6078,7 +5983,7 @@
         </p:nvSpPr>
         <p:spPr>
           <a:xfrm>
-            <a:off x="2746380" y="3484752"/>
+            <a:off x="2746380" y="4295001"/>
             <a:ext cx="1447800" cy="276999"/>
           </a:xfrm>
           <a:prstGeom prst="rect">
@@ -6095,6 +6000,133 @@
             <a:r>
               <a:rPr lang="en-US" sz="1200" dirty="0" smtClean="0"/>
               <a:t>send</a:t>
+            </a:r>
+            <a:endParaRPr lang="en-US" sz="1200" dirty="0"/>
+          </a:p>
+        </p:txBody>
+      </p:sp>
+      <p:sp>
+        <p:nvSpPr>
+          <p:cNvPr id="24" name="TextBox 23"/>
+          <p:cNvSpPr txBox="1"/>
+          <p:nvPr/>
+        </p:nvSpPr>
+        <p:spPr>
+          <a:xfrm>
+            <a:off x="1004323" y="2085201"/>
+            <a:ext cx="1738877" cy="276999"/>
+          </a:xfrm>
+          <a:prstGeom prst="rect">
+            <a:avLst/>
+          </a:prstGeom>
+          <a:noFill/>
+        </p:spPr>
+        <p:txBody>
+          <a:bodyPr wrap="none" rtlCol="0">
+            <a:spAutoFit/>
+          </a:bodyPr>
+          <a:lstStyle/>
+          <a:p>
+            <a:r>
+              <a:rPr lang="en-US" sz="1200" dirty="0" err="1" smtClean="0"/>
+              <a:t>handleIncomingMessage</a:t>
+            </a:r>
+            <a:endParaRPr lang="en-US" sz="1200" dirty="0"/>
+          </a:p>
+        </p:txBody>
+      </p:sp>
+      <p:sp>
+        <p:nvSpPr>
+          <p:cNvPr id="29" name="TextBox 28"/>
+          <p:cNvSpPr txBox="1"/>
+          <p:nvPr/>
+        </p:nvSpPr>
+        <p:spPr>
+          <a:xfrm>
+            <a:off x="4800600" y="3988613"/>
+            <a:ext cx="1447800" cy="276999"/>
+          </a:xfrm>
+          <a:prstGeom prst="rect">
+            <a:avLst/>
+          </a:prstGeom>
+          <a:noFill/>
+        </p:spPr>
+        <p:txBody>
+          <a:bodyPr wrap="square" rtlCol="0">
+            <a:spAutoFit/>
+          </a:bodyPr>
+          <a:lstStyle/>
+          <a:p>
+            <a:r>
+              <a:rPr lang="en-US" sz="1200" dirty="0" smtClean="0"/>
+              <a:t>invoke</a:t>
+            </a:r>
+            <a:endParaRPr lang="en-US" sz="1200" dirty="0"/>
+          </a:p>
+        </p:txBody>
+      </p:sp>
+      <p:cxnSp>
+        <p:nvCxnSpPr>
+          <p:cNvPr id="33" name="Straight Arrow Connector 32"/>
+          <p:cNvCxnSpPr/>
+          <p:nvPr/>
+        </p:nvCxnSpPr>
+        <p:spPr>
+          <a:xfrm flipV="1">
+            <a:off x="4648200" y="3505200"/>
+            <a:ext cx="1908176" cy="1588"/>
+          </a:xfrm>
+          <a:prstGeom prst="straightConnector1">
+            <a:avLst/>
+          </a:prstGeom>
+          <a:ln>
+            <a:solidFill>
+              <a:srgbClr val="000000"/>
+            </a:solidFill>
+            <a:tailEnd type="arrow"/>
+          </a:ln>
+          <a:effectLst/>
+        </p:spPr>
+        <p:style>
+          <a:lnRef idx="2">
+            <a:schemeClr val="accent1"/>
+          </a:lnRef>
+          <a:fillRef idx="0">
+            <a:schemeClr val="accent1"/>
+          </a:fillRef>
+          <a:effectRef idx="1">
+            <a:schemeClr val="accent1"/>
+          </a:effectRef>
+          <a:fontRef idx="minor">
+            <a:schemeClr val="tx1"/>
+          </a:fontRef>
+        </p:style>
+      </p:cxnSp>
+      <p:sp>
+        <p:nvSpPr>
+          <p:cNvPr id="35" name="TextBox 34"/>
+          <p:cNvSpPr txBox="1"/>
+          <p:nvPr/>
+        </p:nvSpPr>
+        <p:spPr>
+          <a:xfrm>
+            <a:off x="4800600" y="3164463"/>
+            <a:ext cx="1447800" cy="276999"/>
+          </a:xfrm>
+          <a:prstGeom prst="rect">
+            <a:avLst/>
+          </a:prstGeom>
+          <a:noFill/>
+        </p:spPr>
+        <p:txBody>
+          <a:bodyPr wrap="square" rtlCol="0">
+            <a:spAutoFit/>
+          </a:bodyPr>
+          <a:lstStyle/>
+          <a:p>
+            <a:r>
+              <a:rPr lang="en-US" sz="1200" dirty="0" smtClean="0"/>
+              <a:t>find</a:t>
             </a:r>
             <a:endParaRPr lang="en-US" sz="1200" dirty="0"/>
           </a:p>
@@ -6133,7 +6165,7 @@
         </p:nvSpPr>
         <p:spPr>
           <a:xfrm>
-            <a:off x="1676400" y="685800"/>
+            <a:off x="3733800" y="685800"/>
             <a:ext cx="1821119" cy="369332"/>
           </a:xfrm>
           <a:prstGeom prst="rect">
@@ -6149,11 +6181,7 @@
           <a:p>
             <a:r>
               <a:rPr lang="en-US" b="1" dirty="0" smtClean="0"/>
-              <a:t>Threading </a:t>
-            </a:r>
-            <a:r>
-              <a:rPr lang="en-US" b="1" dirty="0" smtClean="0"/>
-              <a:t>Mode</a:t>
+              <a:t>Threading Model</a:t>
             </a:r>
             <a:endParaRPr lang="en-US" b="1" dirty="0"/>
           </a:p>
@@ -6539,12 +6567,20 @@
             <a:p>
               <a:pPr algn="ctr"/>
               <a:r>
-                <a:rPr lang="en-US" sz="1000" dirty="0" err="1" smtClean="0">
+                <a:rPr lang="en-US" sz="1000" dirty="0" smtClean="0">
                   <a:solidFill>
                     <a:schemeClr val="tx1"/>
                   </a:solidFill>
                 </a:rPr>
-                <a:t>methodSignatures</a:t>
+                <a:t>C</a:t>
+              </a:r>
+              <a:r>
+                <a:rPr lang="en-US" sz="1000" dirty="0" smtClean="0">
+                  <a:solidFill>
+                    <a:schemeClr val="tx1"/>
+                  </a:solidFill>
+                </a:rPr>
+                <a:t>lass fields</a:t>
               </a:r>
               <a:endParaRPr lang="en-US" sz="1000" dirty="0">
                 <a:solidFill>
@@ -6676,12 +6712,12 @@
             <a:p>
               <a:pPr algn="ctr"/>
               <a:r>
-                <a:rPr lang="en-US" sz="1000" dirty="0" smtClean="0">
+                <a:rPr lang="en-US" sz="1000" dirty="0" err="1" smtClean="0">
                   <a:solidFill>
                     <a:schemeClr val="tx1"/>
                   </a:solidFill>
                 </a:rPr>
-                <a:t>register</a:t>
+                <a:t>sendCommand</a:t>
               </a:r>
               <a:endParaRPr lang="en-US" sz="1000" dirty="0">
                 <a:solidFill>
@@ -6889,22 +6925,6 @@
             <a:lstStyle/>
             <a:p>
               <a:pPr algn="ctr"/>
-              <a:r>
-                <a:rPr lang="en-US" sz="1000" dirty="0" err="1" smtClean="0">
-                  <a:solidFill>
-                    <a:schemeClr val="tx1"/>
-                  </a:solidFill>
-                </a:rPr>
-                <a:t>send(command,target,args</a:t>
-              </a:r>
-              <a:r>
-                <a:rPr lang="en-US" sz="1000" dirty="0" smtClean="0">
-                  <a:solidFill>
-                    <a:schemeClr val="tx1"/>
-                  </a:solidFill>
-                </a:rPr>
-                <a:t>)</a:t>
-              </a:r>
               <a:endParaRPr lang="en-US" sz="1000" dirty="0">
                 <a:solidFill>
                   <a:schemeClr val="tx1"/>
@@ -7086,7 +7106,7 @@
         </p:nvSpPr>
         <p:spPr>
           <a:xfrm>
-            <a:off x="1529729" y="1820071"/>
+            <a:off x="1447800" y="1676400"/>
             <a:ext cx="2566277" cy="2703917"/>
           </a:xfrm>
           <a:custGeom>
@@ -7190,7 +7210,7 @@
         <p:spPr>
           <a:xfrm>
             <a:off x="5493206" y="5148137"/>
-            <a:ext cx="1949722" cy="369332"/>
+            <a:ext cx="1933943" cy="369332"/>
           </a:xfrm>
           <a:prstGeom prst="rect">
             <a:avLst/>
@@ -7205,12 +7225,45 @@
           <a:p>
             <a:r>
               <a:rPr lang="en-US" dirty="0" smtClean="0"/>
-              <a:t>Socket read thread</a:t>
+              <a:t>s</a:t>
+            </a:r>
+            <a:r>
+              <a:rPr lang="en-US" dirty="0" smtClean="0"/>
+              <a:t>ocket </a:t>
+            </a:r>
+            <a:r>
+              <a:rPr lang="en-US" dirty="0" smtClean="0"/>
+              <a:t>read thread</a:t>
             </a:r>
             <a:endParaRPr lang="en-US" dirty="0"/>
           </a:p>
         </p:txBody>
       </p:sp>
+    </p:spTree>
+  </p:cSld>
+  <p:clrMapOvr>
+    <a:masterClrMapping/>
+  </p:clrMapOvr>
+</p:sld>
+</file>
+
+<file path=ppt/slides/slide5.xml><?xml version="1.0" encoding="utf-8"?>
+<p:sld xmlns:a="http://schemas.openxmlformats.org/drawingml/2006/main" xmlns:r="http://schemas.openxmlformats.org/officeDocument/2006/relationships" xmlns:mc="http://schemas.openxmlformats.org/markup-compatibility/2006" xmlns:mv="urn:schemas-microsoft-com:mac:vml" xmlns:p="http://schemas.openxmlformats.org/presentationml/2006/main" mc:Ignorable="mv" mc:PreserveAttributes="mv:*">
+  <p:cSld>
+    <p:spTree>
+      <p:nvGrpSpPr>
+        <p:cNvPr id="1" name=""/>
+        <p:cNvGrpSpPr/>
+        <p:nvPr/>
+      </p:nvGrpSpPr>
+      <p:grpSpPr>
+        <a:xfrm>
+          <a:off x="0" y="0"/>
+          <a:ext cx="0" cy="0"/>
+          <a:chOff x="0" y="0"/>
+          <a:chExt cx="0" cy="0"/>
+        </a:xfrm>
+      </p:grpSpPr>
     </p:spTree>
   </p:cSld>
   <p:clrMapOvr>

</xml_diff>